<commit_message>
changed Final Project ppt
The powerpoint is supposed to be 3 slides, and I had 5. So I edited original project ppt down to 3 slides, and put the extra slides into a separate ppt.
</commit_message>
<xml_diff>
--- a/Final_Project.pptx
+++ b/Final_Project.pptx
@@ -7,9 +7,7 @@
   <p:sldIdLst>
     <p:sldId id="257" r:id="rId5"/>
     <p:sldId id="265" r:id="rId6"/>
-    <p:sldId id="261" r:id="rId7"/>
-    <p:sldId id="266" r:id="rId8"/>
-    <p:sldId id="267" r:id="rId9"/>
+    <p:sldId id="267" r:id="rId7"/>
   </p:sldIdLst>
   <p:sldSz cx="12192000" cy="6858000"/>
   <p:notesSz cx="6858000" cy="9144000"/>
@@ -129,12 +127,12 @@
   <pc:docChgLst>
     <pc:chgData name="Tammy Hansen" userId="dfddb831096982ce" providerId="LiveId" clId="{2DDB1D3A-BDF6-45F1-B887-4886B388FDB3}"/>
     <pc:docChg chg="undo custSel addSld delSld modSld">
-      <pc:chgData name="Tammy Hansen" userId="dfddb831096982ce" providerId="LiveId" clId="{2DDB1D3A-BDF6-45F1-B887-4886B388FDB3}" dt="2021-12-06T23:44:58.561" v="1565" actId="27107"/>
+      <pc:chgData name="Tammy Hansen" userId="dfddb831096982ce" providerId="LiveId" clId="{2DDB1D3A-BDF6-45F1-B887-4886B388FDB3}" dt="2021-12-09T20:46:29.177" v="1568" actId="2696"/>
       <pc:docMkLst>
         <pc:docMk/>
       </pc:docMkLst>
-      <pc:sldChg chg="addSp delSp modSp mod modClrScheme chgLayout">
-        <pc:chgData name="Tammy Hansen" userId="dfddb831096982ce" providerId="LiveId" clId="{2DDB1D3A-BDF6-45F1-B887-4886B388FDB3}" dt="2021-12-06T23:44:40.729" v="1564" actId="20577"/>
+      <pc:sldChg chg="addSp delSp modSp del mod modClrScheme chgLayout">
+        <pc:chgData name="Tammy Hansen" userId="dfddb831096982ce" providerId="LiveId" clId="{2DDB1D3A-BDF6-45F1-B887-4886B388FDB3}" dt="2021-12-09T20:46:26.373" v="1567" actId="2696"/>
         <pc:sldMkLst>
           <pc:docMk/>
           <pc:sldMk cId="183243182" sldId="261"/>
@@ -384,8 +382,8 @@
           </ac:spMkLst>
         </pc:spChg>
       </pc:sldChg>
-      <pc:sldChg chg="addSp delSp modSp mod">
-        <pc:chgData name="Tammy Hansen" userId="dfddb831096982ce" providerId="LiveId" clId="{2DDB1D3A-BDF6-45F1-B887-4886B388FDB3}" dt="2021-12-06T23:44:58.561" v="1565" actId="27107"/>
+      <pc:sldChg chg="addSp delSp modSp del mod">
+        <pc:chgData name="Tammy Hansen" userId="dfddb831096982ce" providerId="LiveId" clId="{2DDB1D3A-BDF6-45F1-B887-4886B388FDB3}" dt="2021-12-09T20:46:29.177" v="1568" actId="2696"/>
         <pc:sldMkLst>
           <pc:docMk/>
           <pc:sldMk cId="1222133304" sldId="266"/>
@@ -407,7 +405,7 @@
           </ac:spMkLst>
         </pc:spChg>
         <pc:spChg chg="mod">
-          <ac:chgData name="Tammy Hansen" userId="dfddb831096982ce" providerId="LiveId" clId="{2DDB1D3A-BDF6-45F1-B887-4886B388FDB3}" dt="2021-12-06T23:44:58.561" v="1565" actId="27107"/>
+          <ac:chgData name="Tammy Hansen" userId="dfddb831096982ce" providerId="LiveId" clId="{2DDB1D3A-BDF6-45F1-B887-4886B388FDB3}" dt="2021-12-07T00:20:12.247" v="1566" actId="27107"/>
           <ac:spMkLst>
             <pc:docMk/>
             <pc:sldMk cId="1222133304" sldId="266"/>
@@ -912,7 +910,7 @@
           <a:p>
             <a:fld id="{EA0C0817-A112-4847-8014-A94B7D2A4EA3}" type="datetime1">
               <a:rPr lang="en-US" smtClean="0"/>
-              <a:t>12/6/2021</a:t>
+              <a:t>12/9/2021</a:t>
             </a:fld>
             <a:endParaRPr lang="en-US" dirty="0"/>
           </a:p>
@@ -1114,7 +1112,7 @@
           <a:p>
             <a:fld id="{7332B432-ACDA-4023-A761-2BAB76577B62}" type="datetime1">
               <a:rPr lang="en-US" smtClean="0"/>
-              <a:t>12/6/2021</a:t>
+              <a:t>12/9/2021</a:t>
             </a:fld>
             <a:endParaRPr lang="en-US" dirty="0"/>
           </a:p>
@@ -1713,7 +1711,7 @@
           <a:p>
             <a:fld id="{D9C646AA-F36E-4540-911D-FFFC0A0EF24A}" type="datetime1">
               <a:rPr lang="en-US" smtClean="0"/>
-              <a:t>12/6/2021</a:t>
+              <a:t>12/9/2021</a:t>
             </a:fld>
             <a:endParaRPr lang="en-US" dirty="0"/>
           </a:p>
@@ -2033,7 +2031,7 @@
           <a:p>
             <a:fld id="{69186D26-FA5F-4637-B602-B7C2DC34CFD4}" type="datetime1">
               <a:rPr lang="en-US" smtClean="0"/>
-              <a:t>12/6/2021</a:t>
+              <a:t>12/9/2021</a:t>
             </a:fld>
             <a:endParaRPr lang="en-US" dirty="0"/>
           </a:p>
@@ -2470,7 +2468,7 @@
           <a:p>
             <a:fld id="{8A7F15D8-96D1-4781-BC50-CA8A088B2FE4}" type="datetime1">
               <a:rPr lang="en-US" smtClean="0"/>
-              <a:t>12/6/2021</a:t>
+              <a:t>12/9/2021</a:t>
             </a:fld>
             <a:endParaRPr lang="en-US" dirty="0"/>
           </a:p>
@@ -2588,7 +2586,7 @@
           <a:p>
             <a:fld id="{F9A96C99-B8F8-4528-BD05-0E16E943DC09}" type="datetime1">
               <a:rPr lang="en-US" smtClean="0"/>
-              <a:t>12/6/2021</a:t>
+              <a:t>12/9/2021</a:t>
             </a:fld>
             <a:endParaRPr lang="en-US" dirty="0"/>
           </a:p>
@@ -2683,7 +2681,7 @@
           <a:p>
             <a:fld id="{03636942-C211-4B28-8DBD-C953E00AF71B}" type="datetime1">
               <a:rPr lang="en-US" smtClean="0"/>
-              <a:t>12/6/2021</a:t>
+              <a:t>12/9/2021</a:t>
             </a:fld>
             <a:endParaRPr lang="en-US" dirty="0"/>
           </a:p>
@@ -3100,7 +3098,7 @@
           <a:p>
             <a:fld id="{7E8D12A6-918A-48BD-8CB9-CA713993B0EA}" type="datetime1">
               <a:rPr lang="en-US" smtClean="0"/>
-              <a:t>12/6/2021</a:t>
+              <a:t>12/9/2021</a:t>
             </a:fld>
             <a:endParaRPr lang="en-US" dirty="0"/>
           </a:p>
@@ -3362,7 +3360,7 @@
             <a:fld id="{E778CE86-875F-4587-BCF6-FA054AFC0D53}" type="datetime1">
               <a:rPr lang="en-US" smtClean="0"/>
               <a:pPr/>
-              <a:t>12/6/2021</a:t>
+              <a:t>12/9/2021</a:t>
             </a:fld>
             <a:endParaRPr lang="en-US" dirty="0"/>
           </a:p>
@@ -3878,7 +3876,7 @@
           <a:p>
             <a:fld id="{F6FA2B21-3FCD-4721-B95C-427943F61125}" type="datetime1">
               <a:rPr lang="en-US" smtClean="0"/>
-              <a:t>12/6/2021</a:t>
+              <a:t>12/9/2021</a:t>
             </a:fld>
             <a:endParaRPr lang="en-US" dirty="0"/>
           </a:p>
@@ -4900,813 +4898,6 @@
 </file>
 
 <file path=ppt/slides/slide3.xml><?xml version="1.0" encoding="utf-8"?>
-<p:sld xmlns:a="http://schemas.openxmlformats.org/drawingml/2006/main" xmlns:r="http://schemas.openxmlformats.org/officeDocument/2006/relationships" xmlns:p="http://schemas.openxmlformats.org/presentationml/2006/main">
-  <p:cSld>
-    <p:spTree>
-      <p:nvGrpSpPr>
-        <p:cNvPr id="1" name=""/>
-        <p:cNvGrpSpPr/>
-        <p:nvPr/>
-      </p:nvGrpSpPr>
-      <p:grpSpPr>
-        <a:xfrm>
-          <a:off x="0" y="0"/>
-          <a:ext cx="0" cy="0"/>
-          <a:chOff x="0" y="0"/>
-          <a:chExt cx="0" cy="0"/>
-        </a:xfrm>
-      </p:grpSpPr>
-      <p:sp>
-        <p:nvSpPr>
-          <p:cNvPr id="2" name="Title 1">
-            <a:extLst>
-              <a:ext uri="{FF2B5EF4-FFF2-40B4-BE49-F238E27FC236}">
-                <a16:creationId xmlns:a16="http://schemas.microsoft.com/office/drawing/2014/main" id="{7A4919D0-F177-4BBA-9A0B-DBA69E2ED764}"/>
-              </a:ext>
-            </a:extLst>
-          </p:cNvPr>
-          <p:cNvSpPr>
-            <a:spLocks noGrp="1"/>
-          </p:cNvSpPr>
-          <p:nvPr>
-            <p:ph type="title"/>
-          </p:nvPr>
-        </p:nvSpPr>
-        <p:spPr/>
-        <p:txBody>
-          <a:bodyPr anchor="ctr">
-            <a:normAutofit/>
-          </a:bodyPr>
-          <a:lstStyle/>
-          <a:p>
-            <a:r>
-              <a:rPr lang="en-US" dirty="0"/>
-              <a:t>Example calculation 1</a:t>
-            </a:r>
-          </a:p>
-        </p:txBody>
-      </p:sp>
-      <p:sp>
-        <p:nvSpPr>
-          <p:cNvPr id="13" name="Subtitle 2">
-            <a:extLst>
-              <a:ext uri="{FF2B5EF4-FFF2-40B4-BE49-F238E27FC236}">
-                <a16:creationId xmlns:a16="http://schemas.microsoft.com/office/drawing/2014/main" id="{4D7F494A-967B-456B-8B01-1FBFACBBB94D}"/>
-              </a:ext>
-            </a:extLst>
-          </p:cNvPr>
-          <p:cNvSpPr txBox="1">
-            <a:spLocks/>
-          </p:cNvSpPr>
-          <p:nvPr/>
-        </p:nvSpPr>
-        <p:spPr>
-          <a:xfrm>
-            <a:off x="1066800" y="2014194"/>
-            <a:ext cx="9112898" cy="4201212"/>
-          </a:xfrm>
-          <a:prstGeom prst="rect">
-            <a:avLst/>
-          </a:prstGeom>
-        </p:spPr>
-        <p:txBody>
-          <a:bodyPr>
-            <a:normAutofit/>
-          </a:bodyPr>
-          <a:lstStyle>
-            <a:lvl1pPr marL="182880" indent="-182880" algn="l" defTabSz="914400" rtl="0" eaLnBrk="1" latinLnBrk="0" hangingPunct="1">
-              <a:lnSpc>
-                <a:spcPct val="110000"/>
-              </a:lnSpc>
-              <a:spcBef>
-                <a:spcPts val="900"/>
-              </a:spcBef>
-              <a:spcAft>
-                <a:spcPts val="0"/>
-              </a:spcAft>
-              <a:buClr>
-                <a:schemeClr val="tx1">
-                  <a:lumMod val="85000"/>
-                  <a:lumOff val="15000"/>
-                </a:schemeClr>
-              </a:buClr>
-              <a:buFont typeface="Garamond" pitchFamily="18" charset="0"/>
-              <a:buChar char="◦"/>
-              <a:defRPr sz="1500" kern="1200">
-                <a:solidFill>
-                  <a:schemeClr val="tx1"/>
-                </a:solidFill>
-                <a:latin typeface="+mn-lt"/>
-                <a:ea typeface="+mn-ea"/>
-                <a:cs typeface="+mn-cs"/>
-              </a:defRPr>
-            </a:lvl1pPr>
-            <a:lvl2pPr marL="457200" indent="-182880" algn="l" defTabSz="914400" rtl="0" eaLnBrk="1" latinLnBrk="0" hangingPunct="1">
-              <a:lnSpc>
-                <a:spcPct val="100000"/>
-              </a:lnSpc>
-              <a:spcBef>
-                <a:spcPts val="500"/>
-              </a:spcBef>
-              <a:buClr>
-                <a:schemeClr val="tx1">
-                  <a:lumMod val="85000"/>
-                  <a:lumOff val="15000"/>
-                </a:schemeClr>
-              </a:buClr>
-              <a:buFont typeface="Garamond" pitchFamily="18" charset="0"/>
-              <a:buChar char="◦"/>
-              <a:defRPr sz="1300" kern="1200">
-                <a:solidFill>
-                  <a:schemeClr val="tx1"/>
-                </a:solidFill>
-                <a:latin typeface="+mn-lt"/>
-                <a:ea typeface="+mn-ea"/>
-                <a:cs typeface="+mn-cs"/>
-              </a:defRPr>
-            </a:lvl2pPr>
-            <a:lvl3pPr marL="731520" indent="-182880" algn="l" defTabSz="914400" rtl="0" eaLnBrk="1" latinLnBrk="0" hangingPunct="1">
-              <a:lnSpc>
-                <a:spcPct val="100000"/>
-              </a:lnSpc>
-              <a:spcBef>
-                <a:spcPts val="500"/>
-              </a:spcBef>
-              <a:buClr>
-                <a:schemeClr val="tx1">
-                  <a:lumMod val="85000"/>
-                  <a:lumOff val="15000"/>
-                </a:schemeClr>
-              </a:buClr>
-              <a:buFont typeface="Garamond" pitchFamily="18" charset="0"/>
-              <a:buChar char="◦"/>
-              <a:defRPr sz="1200" kern="1200">
-                <a:solidFill>
-                  <a:schemeClr val="tx1"/>
-                </a:solidFill>
-                <a:latin typeface="+mn-lt"/>
-                <a:ea typeface="+mn-ea"/>
-                <a:cs typeface="+mn-cs"/>
-              </a:defRPr>
-            </a:lvl3pPr>
-            <a:lvl4pPr marL="1005840" indent="-182880" algn="l" defTabSz="914400" rtl="0" eaLnBrk="1" latinLnBrk="0" hangingPunct="1">
-              <a:lnSpc>
-                <a:spcPct val="100000"/>
-              </a:lnSpc>
-              <a:spcBef>
-                <a:spcPts val="500"/>
-              </a:spcBef>
-              <a:buClr>
-                <a:schemeClr val="tx1">
-                  <a:lumMod val="85000"/>
-                  <a:lumOff val="15000"/>
-                </a:schemeClr>
-              </a:buClr>
-              <a:buFont typeface="Garamond" pitchFamily="18" charset="0"/>
-              <a:buChar char="◦"/>
-              <a:defRPr sz="1200" kern="1200">
-                <a:solidFill>
-                  <a:schemeClr val="tx1"/>
-                </a:solidFill>
-                <a:latin typeface="+mn-lt"/>
-                <a:ea typeface="+mn-ea"/>
-                <a:cs typeface="+mn-cs"/>
-              </a:defRPr>
-            </a:lvl4pPr>
-            <a:lvl5pPr marL="1280160" indent="-182880" algn="l" defTabSz="914400" rtl="0" eaLnBrk="1" latinLnBrk="0" hangingPunct="1">
-              <a:lnSpc>
-                <a:spcPct val="100000"/>
-              </a:lnSpc>
-              <a:spcBef>
-                <a:spcPts val="500"/>
-              </a:spcBef>
-              <a:buClr>
-                <a:schemeClr val="tx1">
-                  <a:lumMod val="85000"/>
-                  <a:lumOff val="15000"/>
-                </a:schemeClr>
-              </a:buClr>
-              <a:buFont typeface="Garamond" pitchFamily="18" charset="0"/>
-              <a:buChar char="◦"/>
-              <a:defRPr sz="1200" kern="1200">
-                <a:solidFill>
-                  <a:schemeClr val="tx1"/>
-                </a:solidFill>
-                <a:latin typeface="+mn-lt"/>
-                <a:ea typeface="+mn-ea"/>
-                <a:cs typeface="+mn-cs"/>
-              </a:defRPr>
-            </a:lvl5pPr>
-            <a:lvl6pPr marL="1600000" indent="-228600" algn="l" defTabSz="914400" rtl="0" eaLnBrk="1" latinLnBrk="0" hangingPunct="1">
-              <a:lnSpc>
-                <a:spcPct val="100000"/>
-              </a:lnSpc>
-              <a:spcBef>
-                <a:spcPts val="500"/>
-              </a:spcBef>
-              <a:buClr>
-                <a:schemeClr val="tx1">
-                  <a:lumMod val="85000"/>
-                  <a:lumOff val="15000"/>
-                </a:schemeClr>
-              </a:buClr>
-              <a:buFont typeface="Garamond" pitchFamily="18" charset="0"/>
-              <a:buChar char="◦"/>
-              <a:defRPr sz="1400" kern="1200">
-                <a:solidFill>
-                  <a:schemeClr val="tx1"/>
-                </a:solidFill>
-                <a:latin typeface="+mn-lt"/>
-                <a:ea typeface="+mn-ea"/>
-                <a:cs typeface="+mn-cs"/>
-              </a:defRPr>
-            </a:lvl6pPr>
-            <a:lvl7pPr marL="1900000" indent="-228600" algn="l" defTabSz="914400" rtl="0" eaLnBrk="1" latinLnBrk="0" hangingPunct="1">
-              <a:lnSpc>
-                <a:spcPct val="100000"/>
-              </a:lnSpc>
-              <a:spcBef>
-                <a:spcPts val="500"/>
-              </a:spcBef>
-              <a:buClr>
-                <a:schemeClr val="tx1">
-                  <a:lumMod val="85000"/>
-                  <a:lumOff val="15000"/>
-                </a:schemeClr>
-              </a:buClr>
-              <a:buFont typeface="Garamond" pitchFamily="18" charset="0"/>
-              <a:buChar char="◦"/>
-              <a:defRPr sz="1400" kern="1200">
-                <a:solidFill>
-                  <a:schemeClr val="tx1"/>
-                </a:solidFill>
-                <a:latin typeface="+mn-lt"/>
-                <a:ea typeface="+mn-ea"/>
-                <a:cs typeface="+mn-cs"/>
-              </a:defRPr>
-            </a:lvl7pPr>
-            <a:lvl8pPr marL="2200000" indent="-228600" algn="l" defTabSz="914400" rtl="0" eaLnBrk="1" latinLnBrk="0" hangingPunct="1">
-              <a:lnSpc>
-                <a:spcPct val="100000"/>
-              </a:lnSpc>
-              <a:spcBef>
-                <a:spcPts val="500"/>
-              </a:spcBef>
-              <a:buClr>
-                <a:schemeClr val="tx1">
-                  <a:lumMod val="85000"/>
-                  <a:lumOff val="15000"/>
-                </a:schemeClr>
-              </a:buClr>
-              <a:buFont typeface="Garamond" pitchFamily="18" charset="0"/>
-              <a:buChar char="◦"/>
-              <a:defRPr sz="1400" kern="1200">
-                <a:solidFill>
-                  <a:schemeClr val="tx1"/>
-                </a:solidFill>
-                <a:latin typeface="+mn-lt"/>
-                <a:ea typeface="+mn-ea"/>
-                <a:cs typeface="+mn-cs"/>
-              </a:defRPr>
-            </a:lvl8pPr>
-            <a:lvl9pPr marL="2500000" indent="-228600" algn="l" defTabSz="914400" rtl="0" eaLnBrk="1" latinLnBrk="0" hangingPunct="1">
-              <a:lnSpc>
-                <a:spcPct val="100000"/>
-              </a:lnSpc>
-              <a:spcBef>
-                <a:spcPts val="500"/>
-              </a:spcBef>
-              <a:buClr>
-                <a:schemeClr val="tx1">
-                  <a:lumMod val="85000"/>
-                  <a:lumOff val="15000"/>
-                </a:schemeClr>
-              </a:buClr>
-              <a:buFont typeface="Garamond" pitchFamily="18" charset="0"/>
-              <a:buChar char="◦"/>
-              <a:defRPr sz="1400" kern="1200">
-                <a:solidFill>
-                  <a:schemeClr val="tx1"/>
-                </a:solidFill>
-                <a:latin typeface="+mn-lt"/>
-                <a:ea typeface="+mn-ea"/>
-                <a:cs typeface="+mn-cs"/>
-              </a:defRPr>
-            </a:lvl9pPr>
-          </a:lstStyle>
-          <a:p>
-            <a:pPr>
-              <a:spcAft>
-                <a:spcPts val="600"/>
-              </a:spcAft>
-            </a:pPr>
-            <a:r>
-              <a:rPr lang="es-ES" sz="2000" dirty="0"/>
-              <a:t>Standard calculator:</a:t>
-            </a:r>
-          </a:p>
-          <a:p>
-            <a:pPr>
-              <a:spcAft>
-                <a:spcPts val="600"/>
-              </a:spcAft>
-            </a:pPr>
-            <a:r>
-              <a:rPr lang="es-ES" sz="2000" dirty="0"/>
-              <a:t>SQRT [ (3)^2 + (4)^2 ]  = 5</a:t>
-            </a:r>
-          </a:p>
-          <a:p>
-            <a:pPr>
-              <a:spcAft>
-                <a:spcPts val="600"/>
-              </a:spcAft>
-            </a:pPr>
-            <a:endParaRPr lang="en-US" sz="2000" dirty="0"/>
-          </a:p>
-          <a:p>
-            <a:pPr>
-              <a:spcAft>
-                <a:spcPts val="600"/>
-              </a:spcAft>
-            </a:pPr>
-            <a:endParaRPr lang="en-US" sz="2000" dirty="0"/>
-          </a:p>
-          <a:p>
-            <a:pPr>
-              <a:spcAft>
-                <a:spcPts val="600"/>
-              </a:spcAft>
-            </a:pPr>
-            <a:r>
-              <a:rPr lang="en-US" sz="2000" dirty="0"/>
-              <a:t>RPN logic calculator:</a:t>
-            </a:r>
-          </a:p>
-          <a:p>
-            <a:pPr>
-              <a:spcAft>
-                <a:spcPts val="600"/>
-              </a:spcAft>
-            </a:pPr>
-            <a:r>
-              <a:rPr lang="en-US" sz="2000" dirty="0"/>
-              <a:t>Enter:  3 ^2 4 ^2 + SQRT</a:t>
-            </a:r>
-            <a:endParaRPr lang="en-US" sz="1700" dirty="0"/>
-          </a:p>
-          <a:p>
-            <a:pPr>
-              <a:spcAft>
-                <a:spcPts val="600"/>
-              </a:spcAft>
-            </a:pPr>
-            <a:endParaRPr lang="en-US" sz="1800" dirty="0"/>
-          </a:p>
-        </p:txBody>
-      </p:sp>
-    </p:spTree>
-    <p:extLst>
-      <p:ext uri="{BB962C8B-B14F-4D97-AF65-F5344CB8AC3E}">
-        <p14:creationId xmlns:p14="http://schemas.microsoft.com/office/powerpoint/2010/main" val="183243182"/>
-      </p:ext>
-    </p:extLst>
-  </p:cSld>
-  <p:clrMapOvr>
-    <a:masterClrMapping/>
-  </p:clrMapOvr>
-</p:sld>
-</file>
-
-<file path=ppt/slides/slide4.xml><?xml version="1.0" encoding="utf-8"?>
-<p:sld xmlns:a="http://schemas.openxmlformats.org/drawingml/2006/main" xmlns:r="http://schemas.openxmlformats.org/officeDocument/2006/relationships" xmlns:p="http://schemas.openxmlformats.org/presentationml/2006/main">
-  <p:cSld>
-    <p:spTree>
-      <p:nvGrpSpPr>
-        <p:cNvPr id="1" name=""/>
-        <p:cNvGrpSpPr/>
-        <p:nvPr/>
-      </p:nvGrpSpPr>
-      <p:grpSpPr>
-        <a:xfrm>
-          <a:off x="0" y="0"/>
-          <a:ext cx="0" cy="0"/>
-          <a:chOff x="0" y="0"/>
-          <a:chExt cx="0" cy="0"/>
-        </a:xfrm>
-      </p:grpSpPr>
-      <p:sp>
-        <p:nvSpPr>
-          <p:cNvPr id="2" name="Title 1">
-            <a:extLst>
-              <a:ext uri="{FF2B5EF4-FFF2-40B4-BE49-F238E27FC236}">
-                <a16:creationId xmlns:a16="http://schemas.microsoft.com/office/drawing/2014/main" id="{7A4919D0-F177-4BBA-9A0B-DBA69E2ED764}"/>
-              </a:ext>
-            </a:extLst>
-          </p:cNvPr>
-          <p:cNvSpPr>
-            <a:spLocks noGrp="1"/>
-          </p:cNvSpPr>
-          <p:nvPr>
-            <p:ph type="title"/>
-          </p:nvPr>
-        </p:nvSpPr>
-        <p:spPr/>
-        <p:txBody>
-          <a:bodyPr anchor="ctr">
-            <a:normAutofit/>
-          </a:bodyPr>
-          <a:lstStyle/>
-          <a:p>
-            <a:r>
-              <a:rPr lang="en-US" dirty="0"/>
-              <a:t>Example calculation 2</a:t>
-            </a:r>
-          </a:p>
-        </p:txBody>
-      </p:sp>
-      <p:sp>
-        <p:nvSpPr>
-          <p:cNvPr id="13" name="Subtitle 2">
-            <a:extLst>
-              <a:ext uri="{FF2B5EF4-FFF2-40B4-BE49-F238E27FC236}">
-                <a16:creationId xmlns:a16="http://schemas.microsoft.com/office/drawing/2014/main" id="{4D7F494A-967B-456B-8B01-1FBFACBBB94D}"/>
-              </a:ext>
-            </a:extLst>
-          </p:cNvPr>
-          <p:cNvSpPr txBox="1">
-            <a:spLocks/>
-          </p:cNvSpPr>
-          <p:nvPr/>
-        </p:nvSpPr>
-        <p:spPr>
-          <a:xfrm>
-            <a:off x="1066800" y="2014194"/>
-            <a:ext cx="9112898" cy="4201212"/>
-          </a:xfrm>
-          <a:prstGeom prst="rect">
-            <a:avLst/>
-          </a:prstGeom>
-        </p:spPr>
-        <p:txBody>
-          <a:bodyPr>
-            <a:normAutofit/>
-          </a:bodyPr>
-          <a:lstStyle>
-            <a:lvl1pPr marL="182880" indent="-182880" algn="l" defTabSz="914400" rtl="0" eaLnBrk="1" latinLnBrk="0" hangingPunct="1">
-              <a:lnSpc>
-                <a:spcPct val="110000"/>
-              </a:lnSpc>
-              <a:spcBef>
-                <a:spcPts val="900"/>
-              </a:spcBef>
-              <a:spcAft>
-                <a:spcPts val="0"/>
-              </a:spcAft>
-              <a:buClr>
-                <a:schemeClr val="tx1">
-                  <a:lumMod val="85000"/>
-                  <a:lumOff val="15000"/>
-                </a:schemeClr>
-              </a:buClr>
-              <a:buFont typeface="Garamond" pitchFamily="18" charset="0"/>
-              <a:buChar char="◦"/>
-              <a:defRPr sz="1500" kern="1200">
-                <a:solidFill>
-                  <a:schemeClr val="tx1"/>
-                </a:solidFill>
-                <a:latin typeface="+mn-lt"/>
-                <a:ea typeface="+mn-ea"/>
-                <a:cs typeface="+mn-cs"/>
-              </a:defRPr>
-            </a:lvl1pPr>
-            <a:lvl2pPr marL="457200" indent="-182880" algn="l" defTabSz="914400" rtl="0" eaLnBrk="1" latinLnBrk="0" hangingPunct="1">
-              <a:lnSpc>
-                <a:spcPct val="100000"/>
-              </a:lnSpc>
-              <a:spcBef>
-                <a:spcPts val="500"/>
-              </a:spcBef>
-              <a:buClr>
-                <a:schemeClr val="tx1">
-                  <a:lumMod val="85000"/>
-                  <a:lumOff val="15000"/>
-                </a:schemeClr>
-              </a:buClr>
-              <a:buFont typeface="Garamond" pitchFamily="18" charset="0"/>
-              <a:buChar char="◦"/>
-              <a:defRPr sz="1300" kern="1200">
-                <a:solidFill>
-                  <a:schemeClr val="tx1"/>
-                </a:solidFill>
-                <a:latin typeface="+mn-lt"/>
-                <a:ea typeface="+mn-ea"/>
-                <a:cs typeface="+mn-cs"/>
-              </a:defRPr>
-            </a:lvl2pPr>
-            <a:lvl3pPr marL="731520" indent="-182880" algn="l" defTabSz="914400" rtl="0" eaLnBrk="1" latinLnBrk="0" hangingPunct="1">
-              <a:lnSpc>
-                <a:spcPct val="100000"/>
-              </a:lnSpc>
-              <a:spcBef>
-                <a:spcPts val="500"/>
-              </a:spcBef>
-              <a:buClr>
-                <a:schemeClr val="tx1">
-                  <a:lumMod val="85000"/>
-                  <a:lumOff val="15000"/>
-                </a:schemeClr>
-              </a:buClr>
-              <a:buFont typeface="Garamond" pitchFamily="18" charset="0"/>
-              <a:buChar char="◦"/>
-              <a:defRPr sz="1200" kern="1200">
-                <a:solidFill>
-                  <a:schemeClr val="tx1"/>
-                </a:solidFill>
-                <a:latin typeface="+mn-lt"/>
-                <a:ea typeface="+mn-ea"/>
-                <a:cs typeface="+mn-cs"/>
-              </a:defRPr>
-            </a:lvl3pPr>
-            <a:lvl4pPr marL="1005840" indent="-182880" algn="l" defTabSz="914400" rtl="0" eaLnBrk="1" latinLnBrk="0" hangingPunct="1">
-              <a:lnSpc>
-                <a:spcPct val="100000"/>
-              </a:lnSpc>
-              <a:spcBef>
-                <a:spcPts val="500"/>
-              </a:spcBef>
-              <a:buClr>
-                <a:schemeClr val="tx1">
-                  <a:lumMod val="85000"/>
-                  <a:lumOff val="15000"/>
-                </a:schemeClr>
-              </a:buClr>
-              <a:buFont typeface="Garamond" pitchFamily="18" charset="0"/>
-              <a:buChar char="◦"/>
-              <a:defRPr sz="1200" kern="1200">
-                <a:solidFill>
-                  <a:schemeClr val="tx1"/>
-                </a:solidFill>
-                <a:latin typeface="+mn-lt"/>
-                <a:ea typeface="+mn-ea"/>
-                <a:cs typeface="+mn-cs"/>
-              </a:defRPr>
-            </a:lvl4pPr>
-            <a:lvl5pPr marL="1280160" indent="-182880" algn="l" defTabSz="914400" rtl="0" eaLnBrk="1" latinLnBrk="0" hangingPunct="1">
-              <a:lnSpc>
-                <a:spcPct val="100000"/>
-              </a:lnSpc>
-              <a:spcBef>
-                <a:spcPts val="500"/>
-              </a:spcBef>
-              <a:buClr>
-                <a:schemeClr val="tx1">
-                  <a:lumMod val="85000"/>
-                  <a:lumOff val="15000"/>
-                </a:schemeClr>
-              </a:buClr>
-              <a:buFont typeface="Garamond" pitchFamily="18" charset="0"/>
-              <a:buChar char="◦"/>
-              <a:defRPr sz="1200" kern="1200">
-                <a:solidFill>
-                  <a:schemeClr val="tx1"/>
-                </a:solidFill>
-                <a:latin typeface="+mn-lt"/>
-                <a:ea typeface="+mn-ea"/>
-                <a:cs typeface="+mn-cs"/>
-              </a:defRPr>
-            </a:lvl5pPr>
-            <a:lvl6pPr marL="1600000" indent="-228600" algn="l" defTabSz="914400" rtl="0" eaLnBrk="1" latinLnBrk="0" hangingPunct="1">
-              <a:lnSpc>
-                <a:spcPct val="100000"/>
-              </a:lnSpc>
-              <a:spcBef>
-                <a:spcPts val="500"/>
-              </a:spcBef>
-              <a:buClr>
-                <a:schemeClr val="tx1">
-                  <a:lumMod val="85000"/>
-                  <a:lumOff val="15000"/>
-                </a:schemeClr>
-              </a:buClr>
-              <a:buFont typeface="Garamond" pitchFamily="18" charset="0"/>
-              <a:buChar char="◦"/>
-              <a:defRPr sz="1400" kern="1200">
-                <a:solidFill>
-                  <a:schemeClr val="tx1"/>
-                </a:solidFill>
-                <a:latin typeface="+mn-lt"/>
-                <a:ea typeface="+mn-ea"/>
-                <a:cs typeface="+mn-cs"/>
-              </a:defRPr>
-            </a:lvl6pPr>
-            <a:lvl7pPr marL="1900000" indent="-228600" algn="l" defTabSz="914400" rtl="0" eaLnBrk="1" latinLnBrk="0" hangingPunct="1">
-              <a:lnSpc>
-                <a:spcPct val="100000"/>
-              </a:lnSpc>
-              <a:spcBef>
-                <a:spcPts val="500"/>
-              </a:spcBef>
-              <a:buClr>
-                <a:schemeClr val="tx1">
-                  <a:lumMod val="85000"/>
-                  <a:lumOff val="15000"/>
-                </a:schemeClr>
-              </a:buClr>
-              <a:buFont typeface="Garamond" pitchFamily="18" charset="0"/>
-              <a:buChar char="◦"/>
-              <a:defRPr sz="1400" kern="1200">
-                <a:solidFill>
-                  <a:schemeClr val="tx1"/>
-                </a:solidFill>
-                <a:latin typeface="+mn-lt"/>
-                <a:ea typeface="+mn-ea"/>
-                <a:cs typeface="+mn-cs"/>
-              </a:defRPr>
-            </a:lvl7pPr>
-            <a:lvl8pPr marL="2200000" indent="-228600" algn="l" defTabSz="914400" rtl="0" eaLnBrk="1" latinLnBrk="0" hangingPunct="1">
-              <a:lnSpc>
-                <a:spcPct val="100000"/>
-              </a:lnSpc>
-              <a:spcBef>
-                <a:spcPts val="500"/>
-              </a:spcBef>
-              <a:buClr>
-                <a:schemeClr val="tx1">
-                  <a:lumMod val="85000"/>
-                  <a:lumOff val="15000"/>
-                </a:schemeClr>
-              </a:buClr>
-              <a:buFont typeface="Garamond" pitchFamily="18" charset="0"/>
-              <a:buChar char="◦"/>
-              <a:defRPr sz="1400" kern="1200">
-                <a:solidFill>
-                  <a:schemeClr val="tx1"/>
-                </a:solidFill>
-                <a:latin typeface="+mn-lt"/>
-                <a:ea typeface="+mn-ea"/>
-                <a:cs typeface="+mn-cs"/>
-              </a:defRPr>
-            </a:lvl8pPr>
-            <a:lvl9pPr marL="2500000" indent="-228600" algn="l" defTabSz="914400" rtl="0" eaLnBrk="1" latinLnBrk="0" hangingPunct="1">
-              <a:lnSpc>
-                <a:spcPct val="100000"/>
-              </a:lnSpc>
-              <a:spcBef>
-                <a:spcPts val="500"/>
-              </a:spcBef>
-              <a:buClr>
-                <a:schemeClr val="tx1">
-                  <a:lumMod val="85000"/>
-                  <a:lumOff val="15000"/>
-                </a:schemeClr>
-              </a:buClr>
-              <a:buFont typeface="Garamond" pitchFamily="18" charset="0"/>
-              <a:buChar char="◦"/>
-              <a:defRPr sz="1400" kern="1200">
-                <a:solidFill>
-                  <a:schemeClr val="tx1"/>
-                </a:solidFill>
-                <a:latin typeface="+mn-lt"/>
-                <a:ea typeface="+mn-ea"/>
-                <a:cs typeface="+mn-cs"/>
-              </a:defRPr>
-            </a:lvl9pPr>
-          </a:lstStyle>
-          <a:p>
-            <a:pPr>
-              <a:spcAft>
-                <a:spcPts val="600"/>
-              </a:spcAft>
-            </a:pPr>
-            <a:r>
-              <a:rPr lang="es-ES" sz="2000" dirty="0"/>
-              <a:t>Quadratic equation:</a:t>
-            </a:r>
-          </a:p>
-          <a:p>
-            <a:r>
-              <a:rPr lang="en-US" sz="2000" dirty="0"/>
-              <a:t>Solve for roots:  aX^2 + bX + c</a:t>
-            </a:r>
-          </a:p>
-          <a:p>
-            <a:r>
-              <a:rPr lang="en-US" sz="2000" dirty="0"/>
-              <a:t>(- b ± SQRT [ (b^2 – 4ac)] ) / 2a </a:t>
-            </a:r>
-          </a:p>
-          <a:p>
-            <a:r>
-              <a:rPr lang="en-US" sz="2000" dirty="0"/>
-              <a:t>Use: a = 2, b = 4, c = -4</a:t>
-            </a:r>
-          </a:p>
-          <a:p>
-            <a:r>
-              <a:rPr lang="en-US" sz="2000" dirty="0"/>
-              <a:t>Roots are: </a:t>
-            </a:r>
-            <a:r>
-              <a:rPr lang="en-US" sz="2000" b="0" i="1" dirty="0">
-                <a:solidFill>
-                  <a:srgbClr val="202122"/>
-                </a:solidFill>
-                <a:effectLst/>
-              </a:rPr>
-              <a:t>x</a:t>
-            </a:r>
-            <a:r>
-              <a:rPr lang="en-US" sz="2000" b="0" i="0" dirty="0">
-                <a:solidFill>
-                  <a:srgbClr val="202122"/>
-                </a:solidFill>
-                <a:effectLst/>
-              </a:rPr>
-              <a:t> = −1 + √3 and </a:t>
-            </a:r>
-            <a:r>
-              <a:rPr lang="en-US" sz="2000" b="0" i="1" dirty="0">
-                <a:solidFill>
-                  <a:srgbClr val="202122"/>
-                </a:solidFill>
-                <a:effectLst/>
-              </a:rPr>
-              <a:t>x</a:t>
-            </a:r>
-            <a:r>
-              <a:rPr lang="en-US" sz="2000" b="0" i="0" dirty="0">
-                <a:solidFill>
-                  <a:srgbClr val="202122"/>
-                </a:solidFill>
-                <a:effectLst/>
-              </a:rPr>
-              <a:t> = −1 − √3  (0.732051 and -2.732051)</a:t>
-            </a:r>
-            <a:endParaRPr lang="en-US" sz="2000" dirty="0"/>
-          </a:p>
-          <a:p>
-            <a:pPr>
-              <a:spcAft>
-                <a:spcPts val="600"/>
-              </a:spcAft>
-            </a:pPr>
-            <a:endParaRPr lang="en-US" sz="2000" dirty="0"/>
-          </a:p>
-          <a:p>
-            <a:pPr>
-              <a:spcAft>
-                <a:spcPts val="600"/>
-              </a:spcAft>
-            </a:pPr>
-            <a:r>
-              <a:rPr lang="en-US" sz="2000" dirty="0"/>
-              <a:t>RPN logic calculator:</a:t>
-            </a:r>
-          </a:p>
-          <a:p>
-            <a:pPr>
-              <a:spcAft>
-                <a:spcPts val="600"/>
-              </a:spcAft>
-            </a:pPr>
-            <a:r>
-              <a:rPr lang="en-US" sz="2000" dirty="0"/>
-              <a:t>Enter:  4 +- 4 2 ^ 4 2 * 4 +- * +- + SQRT + 2 2 * / </a:t>
-            </a:r>
-          </a:p>
-          <a:p>
-            <a:pPr>
-              <a:spcAft>
-                <a:spcPts val="600"/>
-              </a:spcAft>
-            </a:pPr>
-            <a:endParaRPr lang="en-US" sz="2000" dirty="0"/>
-          </a:p>
-          <a:p>
-            <a:pPr>
-              <a:spcAft>
-                <a:spcPts val="600"/>
-              </a:spcAft>
-            </a:pPr>
-            <a:endParaRPr lang="en-US" sz="1800" dirty="0"/>
-          </a:p>
-        </p:txBody>
-      </p:sp>
-    </p:spTree>
-    <p:extLst>
-      <p:ext uri="{BB962C8B-B14F-4D97-AF65-F5344CB8AC3E}">
-        <p14:creationId xmlns:p14="http://schemas.microsoft.com/office/powerpoint/2010/main" val="1222133304"/>
-      </p:ext>
-    </p:extLst>
-  </p:cSld>
-  <p:clrMapOvr>
-    <a:masterClrMapping/>
-  </p:clrMapOvr>
-</p:sld>
-</file>
-
-<file path=ppt/slides/slide5.xml><?xml version="1.0" encoding="utf-8"?>
 <p:sld xmlns:a="http://schemas.openxmlformats.org/drawingml/2006/main" xmlns:r="http://schemas.openxmlformats.org/officeDocument/2006/relationships" xmlns:p="http://schemas.openxmlformats.org/presentationml/2006/main">
   <p:cSld>
     <p:spTree>

</xml_diff>